<commit_message>
ajout des présentations et liens video
</commit_message>
<xml_diff>
--- a/Présentation Lifiled.pptx
+++ b/Présentation Lifiled.pptx
@@ -7052,9 +7052,23 @@
           </a:p>
           <a:p>
             <a:r>
-              <a:rPr lang="fr-FR"/>
+              <a:rPr lang="fr-FR" dirty="0">
+                <a:hlinkClick r:id="rId2"/>
+              </a:rPr>
               <a:t>https://mktraore94.github.io/lifi/</a:t>
             </a:r>
+            <a:endParaRPr lang="fr-FR" dirty="0"/>
+          </a:p>
+          <a:p>
+            <a:r>
+              <a:rPr lang="fr-FR">
+                <a:hlinkClick r:id="rId3"/>
+              </a:rPr>
+              <a:t>https://fromsmash.com/presentation-site-lifiled</a:t>
+            </a:r>
+            <a:endParaRPr lang="fr-FR"/>
+          </a:p>
+          <a:p>
             <a:endParaRPr lang="fr-FR" dirty="0"/>
           </a:p>
         </p:txBody>

</xml_diff>